<commit_message>
kevin changes to powerpoint
</commit_message>
<xml_diff>
--- a/cs250proposal.pptx
+++ b/cs250proposal.pptx
@@ -12,7 +12,6 @@
     <p:sldId id="260" r:id="rId6"/>
     <p:sldId id="264" r:id="rId7"/>
     <p:sldId id="261" r:id="rId8"/>
-    <p:sldId id="262" r:id="rId9"/>
   </p:sldIdLst>
   <p:sldSz cx="9144000" cy="6858000" type="screen4x3"/>
   <p:notesSz cx="6858000" cy="9144000"/>
@@ -3877,7 +3876,7 @@
           <a:p>
             <a:r>
               <a:rPr lang="en-US" dirty="0" smtClean="0"/>
-              <a:t>Hardware Implementation</a:t>
+              <a:t>ALU Structure</a:t>
             </a:r>
             <a:endParaRPr lang="en-US" dirty="0"/>
           </a:p>
@@ -3893,38 +3892,23 @@
             <p:ph idx="1"/>
           </p:nvPr>
         </p:nvSpPr>
-        <p:spPr/>
+        <p:spPr>
+          <a:xfrm>
+            <a:off x="457200" y="1576798"/>
+            <a:ext cx="8229600" cy="1750787"/>
+          </a:xfrm>
+        </p:spPr>
         <p:txBody>
           <a:bodyPr/>
           <a:lstStyle/>
           <a:p>
             <a:r>
               <a:rPr lang="en-US" dirty="0" smtClean="0"/>
-              <a:t>Plenty of RSA encryption hardware</a:t>
-            </a:r>
-          </a:p>
-          <a:p>
+              <a:t>Many </a:t>
+            </a:r>
             <a:r>
               <a:rPr lang="en-US" dirty="0" smtClean="0"/>
-              <a:t>ECSDA has been implemented in hardware</a:t>
-            </a:r>
-            <a:endParaRPr lang="en-US" dirty="0" smtClean="0"/>
-          </a:p>
-          <a:p>
-            <a:pPr lvl="1"/>
-            <a:r>
-              <a:rPr lang="en-US" dirty="0" smtClean="0"/>
-              <a:t>Explored algorithms, not </a:t>
-            </a:r>
-            <a:r>
-              <a:rPr lang="en-US" dirty="0" smtClean="0"/>
-              <a:t>design-space</a:t>
-            </a:r>
-          </a:p>
-          <a:p>
-            <a:r>
-              <a:rPr lang="en-US" dirty="0" smtClean="0"/>
-              <a:t>Many different ALU functions performed</a:t>
+              <a:t>different ALU functions performed</a:t>
             </a:r>
           </a:p>
           <a:p>
@@ -3938,8 +3922,14 @@
             <a:pPr lvl="1"/>
             <a:r>
               <a:rPr lang="en-US" dirty="0" smtClean="0"/>
-              <a:t>Introduces knobs for design-space exploration</a:t>
-            </a:r>
+              <a:t>Introduces knobs for design-space </a:t>
+            </a:r>
+            <a:r>
+              <a:rPr lang="en-US" dirty="0" smtClean="0"/>
+              <a:t>exploration</a:t>
+            </a:r>
+          </a:p>
+          <a:p>
             <a:endParaRPr lang="en-US" dirty="0" smtClean="0"/>
           </a:p>
           <a:p>
@@ -3947,6 +3937,36 @@
           </a:p>
         </p:txBody>
       </p:sp>
+      <p:pic>
+        <p:nvPicPr>
+          <p:cNvPr id="7" name="Picture 6" descr="Screen Shot 2013-10-07 at 12.27.11 PM.png"/>
+          <p:cNvPicPr>
+            <a:picLocks noChangeAspect="1"/>
+          </p:cNvPicPr>
+          <p:nvPr/>
+        </p:nvPicPr>
+        <p:blipFill>
+          <a:blip r:embed="rId2">
+            <a:extLst>
+              <a:ext uri="{28A0092B-C50C-407E-A947-70E740481C1C}">
+                <a14:useLocalDpi xmlns:a14="http://schemas.microsoft.com/office/drawing/2010/main" val="0"/>
+              </a:ext>
+            </a:extLst>
+          </a:blip>
+          <a:stretch>
+            <a:fillRect/>
+          </a:stretch>
+        </p:blipFill>
+        <p:spPr>
+          <a:xfrm>
+            <a:off x="776086" y="3215399"/>
+            <a:ext cx="7756452" cy="3572051"/>
+          </a:xfrm>
+          <a:prstGeom prst="rect">
+            <a:avLst/>
+          </a:prstGeom>
+        </p:spPr>
+      </p:pic>
     </p:spTree>
     <p:extLst>
       <p:ext uri="{BB962C8B-B14F-4D97-AF65-F5344CB8AC3E}">
@@ -4145,35 +4165,51 @@
             <a:pPr lvl="1"/>
             <a:r>
               <a:rPr lang="en-US" dirty="0" smtClean="0"/>
-              <a:t>Variable key sizes?</a:t>
+              <a:t>Introduce </a:t>
+            </a:r>
+            <a:r>
+              <a:rPr lang="en-US" dirty="0" smtClean="0"/>
+              <a:t>more instructions with control </a:t>
+            </a:r>
+            <a:r>
+              <a:rPr lang="en-US" dirty="0" smtClean="0"/>
+              <a:t>block</a:t>
             </a:r>
           </a:p>
           <a:p>
             <a:pPr lvl="1"/>
             <a:r>
               <a:rPr lang="en-US" dirty="0" smtClean="0"/>
-              <a:t>Introduce more instructions with control block</a:t>
-            </a:r>
+              <a:t>Include information about key size</a:t>
+            </a:r>
+            <a:endParaRPr lang="en-US" dirty="0" smtClean="0"/>
           </a:p>
           <a:p>
             <a:r>
               <a:rPr lang="en-US" dirty="0" smtClean="0"/>
-              <a:t>Memory accesses are </a:t>
+              <a:t>Memory accesses are very </a:t>
             </a:r>
             <a:r>
               <a:rPr lang="en-US" dirty="0" smtClean="0"/>
-              <a:t>ver</a:t>
-            </a:r>
+              <a:t>limited</a:t>
+            </a:r>
+          </a:p>
+          <a:p>
+            <a:pPr lvl="1"/>
             <a:r>
               <a:rPr lang="en-US" dirty="0" smtClean="0"/>
-              <a:t>y limited, maybe nonexistent</a:t>
+              <a:t>One load, lots of compute, one store</a:t>
             </a:r>
           </a:p>
           <a:p>
             <a:pPr lvl="1"/>
             <a:r>
               <a:rPr lang="en-US" dirty="0" smtClean="0"/>
-              <a:t>Register file could have all we need</a:t>
+              <a:t>Storage vs. </a:t>
+            </a:r>
+            <a:r>
+              <a:rPr lang="en-US" dirty="0" smtClean="0"/>
+              <a:t>moving data through 64-bit pipe</a:t>
             </a:r>
             <a:endParaRPr lang="en-US" dirty="0" smtClean="0"/>
           </a:p>
@@ -4183,102 +4219,6 @@
     <p:extLst>
       <p:ext uri="{BB962C8B-B14F-4D97-AF65-F5344CB8AC3E}">
         <p14:creationId xmlns:p14="http://schemas.microsoft.com/office/powerpoint/2010/main" val="922662550"/>
-      </p:ext>
-    </p:extLst>
-  </p:cSld>
-  <p:clrMapOvr>
-    <a:masterClrMapping/>
-  </p:clrMapOvr>
-</p:sld>
-</file>
-
-<file path=ppt/slides/slide8.xml><?xml version="1.0" encoding="utf-8"?>
-<p:sld xmlns:a="http://schemas.openxmlformats.org/drawingml/2006/main" xmlns:r="http://schemas.openxmlformats.org/officeDocument/2006/relationships" xmlns:p="http://schemas.openxmlformats.org/presentationml/2006/main">
-  <p:cSld>
-    <p:spTree>
-      <p:nvGrpSpPr>
-        <p:cNvPr id="1" name=""/>
-        <p:cNvGrpSpPr/>
-        <p:nvPr/>
-      </p:nvGrpSpPr>
-      <p:grpSpPr>
-        <a:xfrm>
-          <a:off x="0" y="0"/>
-          <a:ext cx="0" cy="0"/>
-          <a:chOff x="0" y="0"/>
-          <a:chExt cx="0" cy="0"/>
-        </a:xfrm>
-      </p:grpSpPr>
-      <p:sp>
-        <p:nvSpPr>
-          <p:cNvPr id="2" name="Title 1"/>
-          <p:cNvSpPr>
-            <a:spLocks noGrp="1"/>
-          </p:cNvSpPr>
-          <p:nvPr>
-            <p:ph type="title"/>
-          </p:nvPr>
-        </p:nvSpPr>
-        <p:spPr/>
-        <p:txBody>
-          <a:bodyPr/>
-          <a:lstStyle/>
-          <a:p>
-            <a:r>
-              <a:rPr lang="en-US" dirty="0" smtClean="0"/>
-              <a:t>Design Process</a:t>
-            </a:r>
-            <a:endParaRPr lang="en-US" dirty="0"/>
-          </a:p>
-        </p:txBody>
-      </p:sp>
-      <p:sp>
-        <p:nvSpPr>
-          <p:cNvPr id="3" name="Content Placeholder 2"/>
-          <p:cNvSpPr>
-            <a:spLocks noGrp="1"/>
-          </p:cNvSpPr>
-          <p:nvPr>
-            <p:ph idx="1"/>
-          </p:nvPr>
-        </p:nvSpPr>
-        <p:spPr/>
-        <p:txBody>
-          <a:bodyPr/>
-          <a:lstStyle/>
-          <a:p>
-            <a:r>
-              <a:rPr lang="en-US" dirty="0" smtClean="0"/>
-              <a:t>Learn algorithms and implement in software</a:t>
-            </a:r>
-          </a:p>
-          <a:p>
-            <a:r>
-              <a:rPr lang="en-US" dirty="0" smtClean="0"/>
-              <a:t>Design base case in Chisel and push through VLSI tools</a:t>
-            </a:r>
-          </a:p>
-          <a:p>
-            <a:r>
-              <a:rPr lang="en-US" dirty="0" smtClean="0"/>
-              <a:t>Change one dimension of design and repeat</a:t>
-            </a:r>
-          </a:p>
-          <a:p>
-            <a:r>
-              <a:rPr lang="en-US" dirty="0" smtClean="0"/>
-              <a:t>Use techniques learned in class along the way</a:t>
-            </a:r>
-          </a:p>
-          <a:p>
-            <a:endParaRPr lang="en-US" dirty="0"/>
-          </a:p>
-        </p:txBody>
-      </p:sp>
-    </p:spTree>
-    <p:extLst>
-      <p:ext uri="{BB962C8B-B14F-4D97-AF65-F5344CB8AC3E}">
-        <p14:creationId xmlns:p14="http://schemas.microsoft.com/office/powerpoint/2010/main" val="3880282269"/>
       </p:ext>
     </p:extLst>
   </p:cSld>

</xml_diff>

<commit_message>
Another pass on the presentation
</commit_message>
<xml_diff>
--- a/cs250proposal.pptx
+++ b/cs250proposal.pptx
@@ -9,8 +9,8 @@
     <p:sldId id="257" r:id="rId3"/>
     <p:sldId id="258" r:id="rId4"/>
     <p:sldId id="259" r:id="rId5"/>
-    <p:sldId id="260" r:id="rId6"/>
-    <p:sldId id="264" r:id="rId7"/>
+    <p:sldId id="264" r:id="rId6"/>
+    <p:sldId id="260" r:id="rId7"/>
     <p:sldId id="261" r:id="rId8"/>
   </p:sldIdLst>
   <p:sldSz cx="9144000" cy="6858000" type="screen4x3"/>
@@ -110,6 +110,22 @@
       </a:defRPr>
     </a:lvl9pPr>
   </p:defaultTextStyle>
+  <p:extLst>
+    <p:ext uri="{EFAFB233-063F-42B5-8137-9DF3F51BA10A}">
+      <p15:sldGuideLst xmlns:p15="http://schemas.microsoft.com/office/powerpoint/2012/main">
+        <p15:guide id="1" orient="horz" pos="2160">
+          <p15:clr>
+            <a:srgbClr val="A4A3A4"/>
+          </p15:clr>
+        </p15:guide>
+        <p15:guide id="2" pos="2880">
+          <p15:clr>
+            <a:srgbClr val="A4A3A4"/>
+          </p15:clr>
+        </p15:guide>
+      </p15:sldGuideLst>
+    </p:ext>
+  </p:extLst>
 </p:presentation>
 </file>
 
@@ -294,7 +310,7 @@
           <a:p>
             <a:fld id="{2BAFA917-AF57-FE4B-BD05-FBD5C076CEEA}" type="datetimeFigureOut">
               <a:rPr lang="en-US" smtClean="0"/>
-              <a:t>10/7/13</a:t>
+              <a:t>10/7/2013</a:t>
             </a:fld>
             <a:endParaRPr lang="en-US"/>
           </a:p>
@@ -464,7 +480,7 @@
           <a:p>
             <a:fld id="{2BAFA917-AF57-FE4B-BD05-FBD5C076CEEA}" type="datetimeFigureOut">
               <a:rPr lang="en-US" smtClean="0"/>
-              <a:t>10/7/13</a:t>
+              <a:t>10/7/2013</a:t>
             </a:fld>
             <a:endParaRPr lang="en-US"/>
           </a:p>
@@ -644,7 +660,7 @@
           <a:p>
             <a:fld id="{2BAFA917-AF57-FE4B-BD05-FBD5C076CEEA}" type="datetimeFigureOut">
               <a:rPr lang="en-US" smtClean="0"/>
-              <a:t>10/7/13</a:t>
+              <a:t>10/7/2013</a:t>
             </a:fld>
             <a:endParaRPr lang="en-US"/>
           </a:p>
@@ -814,7 +830,7 @@
           <a:p>
             <a:fld id="{2BAFA917-AF57-FE4B-BD05-FBD5C076CEEA}" type="datetimeFigureOut">
               <a:rPr lang="en-US" smtClean="0"/>
-              <a:t>10/7/13</a:t>
+              <a:t>10/7/2013</a:t>
             </a:fld>
             <a:endParaRPr lang="en-US"/>
           </a:p>
@@ -1060,7 +1076,7 @@
           <a:p>
             <a:fld id="{2BAFA917-AF57-FE4B-BD05-FBD5C076CEEA}" type="datetimeFigureOut">
               <a:rPr lang="en-US" smtClean="0"/>
-              <a:t>10/7/13</a:t>
+              <a:t>10/7/2013</a:t>
             </a:fld>
             <a:endParaRPr lang="en-US"/>
           </a:p>
@@ -1348,7 +1364,7 @@
           <a:p>
             <a:fld id="{2BAFA917-AF57-FE4B-BD05-FBD5C076CEEA}" type="datetimeFigureOut">
               <a:rPr lang="en-US" smtClean="0"/>
-              <a:t>10/7/13</a:t>
+              <a:t>10/7/2013</a:t>
             </a:fld>
             <a:endParaRPr lang="en-US"/>
           </a:p>
@@ -1770,7 +1786,7 @@
           <a:p>
             <a:fld id="{2BAFA917-AF57-FE4B-BD05-FBD5C076CEEA}" type="datetimeFigureOut">
               <a:rPr lang="en-US" smtClean="0"/>
-              <a:t>10/7/13</a:t>
+              <a:t>10/7/2013</a:t>
             </a:fld>
             <a:endParaRPr lang="en-US"/>
           </a:p>
@@ -1888,7 +1904,7 @@
           <a:p>
             <a:fld id="{2BAFA917-AF57-FE4B-BD05-FBD5C076CEEA}" type="datetimeFigureOut">
               <a:rPr lang="en-US" smtClean="0"/>
-              <a:t>10/7/13</a:t>
+              <a:t>10/7/2013</a:t>
             </a:fld>
             <a:endParaRPr lang="en-US"/>
           </a:p>
@@ -1983,7 +1999,7 @@
           <a:p>
             <a:fld id="{2BAFA917-AF57-FE4B-BD05-FBD5C076CEEA}" type="datetimeFigureOut">
               <a:rPr lang="en-US" smtClean="0"/>
-              <a:t>10/7/13</a:t>
+              <a:t>10/7/2013</a:t>
             </a:fld>
             <a:endParaRPr lang="en-US"/>
           </a:p>
@@ -2260,7 +2276,7 @@
           <a:p>
             <a:fld id="{2BAFA917-AF57-FE4B-BD05-FBD5C076CEEA}" type="datetimeFigureOut">
               <a:rPr lang="en-US" smtClean="0"/>
-              <a:t>10/7/13</a:t>
+              <a:t>10/7/2013</a:t>
             </a:fld>
             <a:endParaRPr lang="en-US"/>
           </a:p>
@@ -2513,7 +2529,7 @@
           <a:p>
             <a:fld id="{2BAFA917-AF57-FE4B-BD05-FBD5C076CEEA}" type="datetimeFigureOut">
               <a:rPr lang="en-US" smtClean="0"/>
-              <a:t>10/7/13</a:t>
+              <a:t>10/7/2013</a:t>
             </a:fld>
             <a:endParaRPr lang="en-US"/>
           </a:p>
@@ -2726,7 +2742,7 @@
           <a:p>
             <a:fld id="{2BAFA917-AF57-FE4B-BD05-FBD5C076CEEA}" type="datetimeFigureOut">
               <a:rPr lang="en-US" smtClean="0"/>
-              <a:t>10/7/13</a:t>
+              <a:t>10/7/2013</a:t>
             </a:fld>
             <a:endParaRPr lang="en-US"/>
           </a:p>
@@ -3202,7 +3218,7 @@
           <a:p>
             <a:r>
               <a:rPr lang="en-US" dirty="0" smtClean="0"/>
-              <a:t>Digital Signatures</a:t>
+              <a:t>Public-Key Cryptography</a:t>
             </a:r>
             <a:endParaRPr lang="en-US" dirty="0"/>
           </a:p>
@@ -3225,32 +3241,42 @@
           <a:p>
             <a:r>
               <a:rPr lang="en-US" dirty="0" smtClean="0"/>
-              <a:t>An n-bit key is used to sign and verify encrypted messages</a:t>
-            </a:r>
-          </a:p>
-          <a:p>
+              <a:t>Solve key distribution problem</a:t>
+            </a:r>
+          </a:p>
+          <a:p>
+            <a:pPr lvl="1"/>
             <a:r>
               <a:rPr lang="en-US" dirty="0" smtClean="0"/>
-              <a:t>Protection comes from prime factorization and the discrete logarithm problem</a:t>
+              <a:t>Public key and private key</a:t>
             </a:r>
           </a:p>
           <a:p>
             <a:r>
               <a:rPr lang="en-US" dirty="0" smtClean="0"/>
-              <a:t>Bigger keys give more security</a:t>
-            </a:r>
-          </a:p>
-          <a:p>
+              <a:t>Based on asymmetric mathematics</a:t>
+            </a:r>
+          </a:p>
+          <a:p>
+            <a:pPr lvl="1"/>
             <a:r>
               <a:rPr lang="en-US" dirty="0" smtClean="0"/>
-              <a:t>DSA is a NIST standard that is widely used</a:t>
-            </a:r>
-          </a:p>
-          <a:p>
-            <a:pPr marL="0" indent="0">
-              <a:buNone/>
-            </a:pPr>
-            <a:endParaRPr lang="en-US" dirty="0" smtClean="0"/>
+              <a:t>Solving the discrete logarithm problem</a:t>
+            </a:r>
+            <a:endParaRPr lang="en-US" dirty="0"/>
+          </a:p>
+          <a:p>
+            <a:r>
+              <a:rPr lang="en-US" dirty="0" smtClean="0"/>
+              <a:t>Widely used</a:t>
+            </a:r>
+          </a:p>
+          <a:p>
+            <a:pPr lvl="1"/>
+            <a:r>
+              <a:rPr lang="en-US" dirty="0" smtClean="0"/>
+              <a:t>SSL/TLS, SSH, …</a:t>
+            </a:r>
           </a:p>
         </p:txBody>
       </p:sp>
@@ -3301,7 +3327,7 @@
           <a:p>
             <a:r>
               <a:rPr lang="en-US" dirty="0" smtClean="0"/>
-              <a:t>Elliptic Curve Cryptography (ECC)	</a:t>
+              <a:t>Why Elliptic Curves?</a:t>
             </a:r>
             <a:endParaRPr lang="en-US" dirty="0"/>
           </a:p>
@@ -3324,21 +3350,54 @@
           <a:p>
             <a:r>
               <a:rPr lang="en-US" dirty="0" smtClean="0"/>
-              <a:t>Key size becomes an issue with DSA</a:t>
+              <a:t>We could use many groups</a:t>
             </a:r>
           </a:p>
           <a:p>
             <a:r>
               <a:rPr lang="en-US" dirty="0" smtClean="0"/>
-              <a:t>Solution: change the field from finite integer fields to elliptic curves</a:t>
+              <a:t>Probably-prime finite integers</a:t>
             </a:r>
           </a:p>
           <a:p>
             <a:pPr lvl="1"/>
             <a:r>
               <a:rPr lang="en-US" dirty="0" smtClean="0"/>
-              <a:t>Mathematically more complicated but saves bits!</a:t>
-            </a:r>
+              <a:t>Fast in HW, sub-</a:t>
+            </a:r>
+            <a:r>
+              <a:rPr lang="en-US" dirty="0" err="1" smtClean="0"/>
+              <a:t>exp</a:t>
+            </a:r>
+            <a:r>
+              <a:rPr lang="en-US" dirty="0" smtClean="0"/>
+              <a:t> algorithms known</a:t>
+            </a:r>
+          </a:p>
+          <a:p>
+            <a:r>
+              <a:rPr lang="en-US" dirty="0" smtClean="0"/>
+              <a:t>Elliptic Curves</a:t>
+            </a:r>
+          </a:p>
+          <a:p>
+            <a:pPr lvl="1"/>
+            <a:r>
+              <a:rPr lang="en-US" dirty="0" smtClean="0"/>
+              <a:t>Slow in HW, no sub-</a:t>
+            </a:r>
+            <a:r>
+              <a:rPr lang="en-US" dirty="0" err="1" smtClean="0"/>
+              <a:t>exp</a:t>
+            </a:r>
+            <a:r>
+              <a:rPr lang="en-US" dirty="0" smtClean="0"/>
+              <a:t> algorithms known</a:t>
+            </a:r>
+            <a:endParaRPr lang="en-US" dirty="0" smtClean="0"/>
+          </a:p>
+          <a:p>
+            <a:endParaRPr lang="en-US" dirty="0" smtClean="0"/>
           </a:p>
         </p:txBody>
       </p:sp>
@@ -3351,13 +3410,13 @@
           <p:nvPr>
             <p:extLst>
               <p:ext uri="{D42A27DB-BD31-4B8C-83A1-F6EECF244321}">
-                <p14:modId xmlns:p14="http://schemas.microsoft.com/office/powerpoint/2010/main" val="1402717396"/>
+                <p14:modId xmlns:p14="http://schemas.microsoft.com/office/powerpoint/2010/main" val="2290395703"/>
               </p:ext>
             </p:extLst>
           </p:nvPr>
         </p:nvGraphicFramePr>
         <p:xfrm>
-          <a:off x="1524000" y="4045337"/>
+          <a:off x="1420305" y="4507250"/>
           <a:ext cx="6096000" cy="2225040"/>
         </p:xfrm>
         <a:graphic>
@@ -3396,7 +3455,7 @@
                       <a:pPr algn="ctr"/>
                       <a:r>
                         <a:rPr lang="en-US" dirty="0" smtClean="0"/>
-                        <a:t>DSA</a:t>
+                        <a:t>Integer</a:t>
                       </a:r>
                       <a:endParaRPr lang="en-US" dirty="0"/>
                     </a:p>
@@ -3411,7 +3470,7 @@
                       <a:pPr algn="ctr"/>
                       <a:r>
                         <a:rPr lang="en-US" dirty="0" smtClean="0"/>
-                        <a:t>ECDSA</a:t>
+                        <a:t>EC</a:t>
                       </a:r>
                       <a:endParaRPr lang="en-US" dirty="0"/>
                     </a:p>
@@ -3794,36 +3853,257 @@
           <a:p>
             <a:r>
               <a:rPr lang="en-US" dirty="0" smtClean="0"/>
-              <a:t>Some theory??	</a:t>
+              <a:t>What is an Elliptic Curve?</a:t>
             </a:r>
             <a:endParaRPr lang="en-US" dirty="0"/>
           </a:p>
         </p:txBody>
       </p:sp>
-      <p:sp>
-        <p:nvSpPr>
-          <p:cNvPr id="3" name="Content Placeholder 2"/>
-          <p:cNvSpPr>
-            <a:spLocks noGrp="1"/>
-          </p:cNvSpPr>
+      <p:pic>
+        <p:nvPicPr>
+          <p:cNvPr id="4" name="Content Placeholder 3"/>
+          <p:cNvPicPr>
+            <a:picLocks noGrp="1" noChangeAspect="1"/>
+          </p:cNvPicPr>
           <p:nvPr>
             <p:ph idx="1"/>
           </p:nvPr>
-        </p:nvSpPr>
-        <p:spPr/>
-        <p:txBody>
-          <a:bodyPr/>
-          <a:lstStyle/>
+        </p:nvPicPr>
+        <p:blipFill>
+          <a:blip r:embed="rId2">
+            <a:extLst>
+              <a:ext uri="{28A0092B-C50C-407E-A947-70E740481C1C}">
+                <a14:useLocalDpi xmlns:a14="http://schemas.microsoft.com/office/drawing/2010/main" val="0"/>
+              </a:ext>
+            </a:extLst>
+          </a:blip>
+          <a:stretch>
+            <a:fillRect/>
+          </a:stretch>
+        </p:blipFill>
+        <p:spPr>
+          <a:xfrm>
+            <a:off x="560895" y="1621647"/>
+            <a:ext cx="8229600" cy="655787"/>
+          </a:xfrm>
+        </p:spPr>
+      </p:pic>
+      <p:pic>
+        <p:nvPicPr>
+          <p:cNvPr id="5" name="Picture 4"/>
+          <p:cNvPicPr>
+            <a:picLocks noChangeAspect="1"/>
+          </p:cNvPicPr>
+          <p:nvPr/>
+        </p:nvPicPr>
+        <p:blipFill>
+          <a:blip r:embed="rId3">
+            <a:extLst>
+              <a:ext uri="{28A0092B-C50C-407E-A947-70E740481C1C}">
+                <a14:useLocalDpi xmlns:a14="http://schemas.microsoft.com/office/drawing/2010/main" val="0"/>
+              </a:ext>
+            </a:extLst>
+          </a:blip>
+          <a:stretch>
+            <a:fillRect/>
+          </a:stretch>
+        </p:blipFill>
+        <p:spPr>
+          <a:xfrm>
+            <a:off x="1027521" y="2773601"/>
+            <a:ext cx="2884604" cy="3504788"/>
+          </a:xfrm>
+          <a:prstGeom prst="rect">
+            <a:avLst/>
+          </a:prstGeom>
+        </p:spPr>
+      </p:pic>
+      <p:sp>
+        <p:nvSpPr>
+          <p:cNvPr id="6" name="Content Placeholder 2"/>
+          <p:cNvSpPr txBox="1">
+            <a:spLocks/>
+          </p:cNvSpPr>
+          <p:nvPr/>
+        </p:nvSpPr>
+        <p:spPr>
+          <a:xfrm>
+            <a:off x="4298623" y="2773601"/>
+            <a:ext cx="4388177" cy="3352562"/>
+          </a:xfrm>
+          <a:prstGeom prst="rect">
+            <a:avLst/>
+          </a:prstGeom>
+        </p:spPr>
+        <p:txBody>
+          <a:bodyPr vert="horz" lIns="91440" tIns="45720" rIns="91440" bIns="45720" rtlCol="0">
+            <a:normAutofit/>
+          </a:bodyPr>
+          <a:lstStyle>
+            <a:lvl1pPr marL="342900" indent="-342900" algn="l" defTabSz="457200" rtl="0" eaLnBrk="1" latinLnBrk="0" hangingPunct="1">
+              <a:spcBef>
+                <a:spcPct val="20000"/>
+              </a:spcBef>
+              <a:buFont typeface="Arial"/>
+              <a:buChar char="•"/>
+              <a:defRPr sz="3200" kern="1200">
+                <a:solidFill>
+                  <a:schemeClr val="tx1"/>
+                </a:solidFill>
+                <a:latin typeface="+mn-lt"/>
+                <a:ea typeface="+mn-ea"/>
+                <a:cs typeface="+mn-cs"/>
+              </a:defRPr>
+            </a:lvl1pPr>
+            <a:lvl2pPr marL="742950" indent="-285750" algn="l" defTabSz="457200" rtl="0" eaLnBrk="1" latinLnBrk="0" hangingPunct="1">
+              <a:spcBef>
+                <a:spcPct val="20000"/>
+              </a:spcBef>
+              <a:buFont typeface="Arial"/>
+              <a:buChar char="–"/>
+              <a:defRPr sz="2800" kern="1200">
+                <a:solidFill>
+                  <a:schemeClr val="tx1"/>
+                </a:solidFill>
+                <a:latin typeface="+mn-lt"/>
+                <a:ea typeface="+mn-ea"/>
+                <a:cs typeface="+mn-cs"/>
+              </a:defRPr>
+            </a:lvl2pPr>
+            <a:lvl3pPr marL="1143000" indent="-228600" algn="l" defTabSz="457200" rtl="0" eaLnBrk="1" latinLnBrk="0" hangingPunct="1">
+              <a:spcBef>
+                <a:spcPct val="20000"/>
+              </a:spcBef>
+              <a:buFont typeface="Arial"/>
+              <a:buChar char="•"/>
+              <a:defRPr sz="2400" kern="1200">
+                <a:solidFill>
+                  <a:schemeClr val="tx1"/>
+                </a:solidFill>
+                <a:latin typeface="+mn-lt"/>
+                <a:ea typeface="+mn-ea"/>
+                <a:cs typeface="+mn-cs"/>
+              </a:defRPr>
+            </a:lvl3pPr>
+            <a:lvl4pPr marL="1600200" indent="-228600" algn="l" defTabSz="457200" rtl="0" eaLnBrk="1" latinLnBrk="0" hangingPunct="1">
+              <a:spcBef>
+                <a:spcPct val="20000"/>
+              </a:spcBef>
+              <a:buFont typeface="Arial"/>
+              <a:buChar char="–"/>
+              <a:defRPr sz="2000" kern="1200">
+                <a:solidFill>
+                  <a:schemeClr val="tx1"/>
+                </a:solidFill>
+                <a:latin typeface="+mn-lt"/>
+                <a:ea typeface="+mn-ea"/>
+                <a:cs typeface="+mn-cs"/>
+              </a:defRPr>
+            </a:lvl4pPr>
+            <a:lvl5pPr marL="2057400" indent="-228600" algn="l" defTabSz="457200" rtl="0" eaLnBrk="1" latinLnBrk="0" hangingPunct="1">
+              <a:spcBef>
+                <a:spcPct val="20000"/>
+              </a:spcBef>
+              <a:buFont typeface="Arial"/>
+              <a:buChar char="»"/>
+              <a:defRPr sz="2000" kern="1200">
+                <a:solidFill>
+                  <a:schemeClr val="tx1"/>
+                </a:solidFill>
+                <a:latin typeface="+mn-lt"/>
+                <a:ea typeface="+mn-ea"/>
+                <a:cs typeface="+mn-cs"/>
+              </a:defRPr>
+            </a:lvl5pPr>
+            <a:lvl6pPr marL="2514600" indent="-228600" algn="l" defTabSz="457200" rtl="0" eaLnBrk="1" latinLnBrk="0" hangingPunct="1">
+              <a:spcBef>
+                <a:spcPct val="20000"/>
+              </a:spcBef>
+              <a:buFont typeface="Arial"/>
+              <a:buChar char="•"/>
+              <a:defRPr sz="2000" kern="1200">
+                <a:solidFill>
+                  <a:schemeClr val="tx1"/>
+                </a:solidFill>
+                <a:latin typeface="+mn-lt"/>
+                <a:ea typeface="+mn-ea"/>
+                <a:cs typeface="+mn-cs"/>
+              </a:defRPr>
+            </a:lvl6pPr>
+            <a:lvl7pPr marL="2971800" indent="-228600" algn="l" defTabSz="457200" rtl="0" eaLnBrk="1" latinLnBrk="0" hangingPunct="1">
+              <a:spcBef>
+                <a:spcPct val="20000"/>
+              </a:spcBef>
+              <a:buFont typeface="Arial"/>
+              <a:buChar char="•"/>
+              <a:defRPr sz="2000" kern="1200">
+                <a:solidFill>
+                  <a:schemeClr val="tx1"/>
+                </a:solidFill>
+                <a:latin typeface="+mn-lt"/>
+                <a:ea typeface="+mn-ea"/>
+                <a:cs typeface="+mn-cs"/>
+              </a:defRPr>
+            </a:lvl7pPr>
+            <a:lvl8pPr marL="3429000" indent="-228600" algn="l" defTabSz="457200" rtl="0" eaLnBrk="1" latinLnBrk="0" hangingPunct="1">
+              <a:spcBef>
+                <a:spcPct val="20000"/>
+              </a:spcBef>
+              <a:buFont typeface="Arial"/>
+              <a:buChar char="•"/>
+              <a:defRPr sz="2000" kern="1200">
+                <a:solidFill>
+                  <a:schemeClr val="tx1"/>
+                </a:solidFill>
+                <a:latin typeface="+mn-lt"/>
+                <a:ea typeface="+mn-ea"/>
+                <a:cs typeface="+mn-cs"/>
+              </a:defRPr>
+            </a:lvl8pPr>
+            <a:lvl9pPr marL="3886200" indent="-228600" algn="l" defTabSz="457200" rtl="0" eaLnBrk="1" latinLnBrk="0" hangingPunct="1">
+              <a:spcBef>
+                <a:spcPct val="20000"/>
+              </a:spcBef>
+              <a:buFont typeface="Arial"/>
+              <a:buChar char="•"/>
+              <a:defRPr sz="2000" kern="1200">
+                <a:solidFill>
+                  <a:schemeClr val="tx1"/>
+                </a:solidFill>
+                <a:latin typeface="+mn-lt"/>
+                <a:ea typeface="+mn-ea"/>
+                <a:cs typeface="+mn-cs"/>
+              </a:defRPr>
+            </a:lvl9pPr>
+          </a:lstStyle>
           <a:p>
             <a:r>
               <a:rPr lang="en-US" dirty="0" smtClean="0"/>
-              <a:t>Might be good to introduce a bit of theory</a:t>
+              <a:t>EC on real numbers</a:t>
             </a:r>
           </a:p>
           <a:p>
             <a:r>
               <a:rPr lang="en-US" dirty="0" smtClean="0"/>
-              <a:t>However, neither of us know too much so might just set us up for disaster, maybe just ignore it..</a:t>
+              <a:t>Some constants</a:t>
+            </a:r>
+          </a:p>
+          <a:p>
+            <a:r>
+              <a:rPr lang="en-US" dirty="0" smtClean="0"/>
+              <a:t>Closed under addition</a:t>
+            </a:r>
+          </a:p>
+          <a:p>
+            <a:r>
+              <a:rPr lang="en-US" dirty="0" smtClean="0"/>
+              <a:t>More expensive</a:t>
+            </a:r>
+          </a:p>
+          <a:p>
+            <a:r>
+              <a:rPr lang="en-US" dirty="0" smtClean="0"/>
+              <a:t>Need a finite field</a:t>
             </a:r>
             <a:endParaRPr lang="en-US" dirty="0"/>
           </a:p>
@@ -3876,6 +4156,122 @@
           <a:p>
             <a:r>
               <a:rPr lang="en-US" dirty="0" smtClean="0"/>
+              <a:t>Design Space</a:t>
+            </a:r>
+            <a:endParaRPr lang="en-US" dirty="0"/>
+          </a:p>
+        </p:txBody>
+      </p:sp>
+      <p:sp>
+        <p:nvSpPr>
+          <p:cNvPr id="3" name="Content Placeholder 2"/>
+          <p:cNvSpPr>
+            <a:spLocks noGrp="1"/>
+          </p:cNvSpPr>
+          <p:nvPr>
+            <p:ph idx="1"/>
+          </p:nvPr>
+        </p:nvSpPr>
+        <p:spPr/>
+        <p:txBody>
+          <a:bodyPr/>
+          <a:lstStyle/>
+          <a:p>
+            <a:r>
+              <a:rPr lang="en-US" dirty="0" smtClean="0"/>
+              <a:t>ALU structure</a:t>
+            </a:r>
+          </a:p>
+          <a:p>
+            <a:pPr lvl="1"/>
+            <a:r>
+              <a:rPr lang="en-US" dirty="0" smtClean="0"/>
+              <a:t>Large multiplier vs. chained small multipliers</a:t>
+            </a:r>
+          </a:p>
+          <a:p>
+            <a:pPr lvl="1"/>
+            <a:r>
+              <a:rPr lang="en-US" dirty="0" smtClean="0"/>
+              <a:t>Specific hardware units vs. general purpose</a:t>
+            </a:r>
+          </a:p>
+          <a:p>
+            <a:r>
+              <a:rPr lang="en-US" dirty="0" smtClean="0"/>
+              <a:t>Complexity of control block</a:t>
+            </a:r>
+          </a:p>
+          <a:p>
+            <a:pPr lvl="1"/>
+            <a:r>
+              <a:rPr lang="en-US" dirty="0" smtClean="0"/>
+              <a:t>Could have some state managed by Rocket</a:t>
+            </a:r>
+          </a:p>
+          <a:p>
+            <a:r>
+              <a:rPr lang="en-US" dirty="0" smtClean="0"/>
+              <a:t>Changing the algorithm </a:t>
+            </a:r>
+          </a:p>
+          <a:p>
+            <a:pPr lvl="1"/>
+            <a:r>
+              <a:rPr lang="en-US" dirty="0" smtClean="0"/>
+              <a:t>Already been done, probably just pick one</a:t>
+            </a:r>
+            <a:endParaRPr lang="en-US" dirty="0"/>
+          </a:p>
+        </p:txBody>
+      </p:sp>
+    </p:spTree>
+    <p:extLst>
+      <p:ext uri="{BB962C8B-B14F-4D97-AF65-F5344CB8AC3E}">
+        <p14:creationId xmlns:p14="http://schemas.microsoft.com/office/powerpoint/2010/main" val="1151698483"/>
+      </p:ext>
+    </p:extLst>
+  </p:cSld>
+  <p:clrMapOvr>
+    <a:masterClrMapping/>
+  </p:clrMapOvr>
+</p:sld>
+</file>
+
+<file path=ppt/slides/slide6.xml><?xml version="1.0" encoding="utf-8"?>
+<p:sld xmlns:a="http://schemas.openxmlformats.org/drawingml/2006/main" xmlns:r="http://schemas.openxmlformats.org/officeDocument/2006/relationships" xmlns:p="http://schemas.openxmlformats.org/presentationml/2006/main">
+  <p:cSld>
+    <p:spTree>
+      <p:nvGrpSpPr>
+        <p:cNvPr id="1" name=""/>
+        <p:cNvGrpSpPr/>
+        <p:nvPr/>
+      </p:nvGrpSpPr>
+      <p:grpSpPr>
+        <a:xfrm>
+          <a:off x="0" y="0"/>
+          <a:ext cx="0" cy="0"/>
+          <a:chOff x="0" y="0"/>
+          <a:chExt cx="0" cy="0"/>
+        </a:xfrm>
+      </p:grpSpPr>
+      <p:sp>
+        <p:nvSpPr>
+          <p:cNvPr id="2" name="Title 1"/>
+          <p:cNvSpPr>
+            <a:spLocks noGrp="1"/>
+          </p:cNvSpPr>
+          <p:nvPr>
+            <p:ph type="title"/>
+          </p:nvPr>
+        </p:nvSpPr>
+        <p:spPr/>
+        <p:txBody>
+          <a:bodyPr/>
+          <a:lstStyle/>
+          <a:p>
+            <a:r>
+              <a:rPr lang="en-US" dirty="0" smtClean="0"/>
               <a:t>ALU Structure</a:t>
             </a:r>
             <a:endParaRPr lang="en-US" dirty="0"/>
@@ -3904,11 +4300,7 @@
           <a:p>
             <a:r>
               <a:rPr lang="en-US" dirty="0" smtClean="0"/>
-              <a:t>Many </a:t>
-            </a:r>
-            <a:r>
-              <a:rPr lang="en-US" dirty="0" smtClean="0"/>
-              <a:t>different ALU functions performed</a:t>
+              <a:t>Many different ALU functions performed</a:t>
             </a:r>
           </a:p>
           <a:p>
@@ -3922,11 +4314,7 @@
             <a:pPr lvl="1"/>
             <a:r>
               <a:rPr lang="en-US" dirty="0" smtClean="0"/>
-              <a:t>Introduces knobs for design-space </a:t>
-            </a:r>
-            <a:r>
-              <a:rPr lang="en-US" dirty="0" smtClean="0"/>
-              <a:t>exploration</a:t>
+              <a:t>Introduces knobs for design-space exploration</a:t>
             </a:r>
           </a:p>
           <a:p>
@@ -3980,122 +4368,6 @@
 </p:sld>
 </file>
 
-<file path=ppt/slides/slide6.xml><?xml version="1.0" encoding="utf-8"?>
-<p:sld xmlns:a="http://schemas.openxmlformats.org/drawingml/2006/main" xmlns:r="http://schemas.openxmlformats.org/officeDocument/2006/relationships" xmlns:p="http://schemas.openxmlformats.org/presentationml/2006/main">
-  <p:cSld>
-    <p:spTree>
-      <p:nvGrpSpPr>
-        <p:cNvPr id="1" name=""/>
-        <p:cNvGrpSpPr/>
-        <p:nvPr/>
-      </p:nvGrpSpPr>
-      <p:grpSpPr>
-        <a:xfrm>
-          <a:off x="0" y="0"/>
-          <a:ext cx="0" cy="0"/>
-          <a:chOff x="0" y="0"/>
-          <a:chExt cx="0" cy="0"/>
-        </a:xfrm>
-      </p:grpSpPr>
-      <p:sp>
-        <p:nvSpPr>
-          <p:cNvPr id="2" name="Title 1"/>
-          <p:cNvSpPr>
-            <a:spLocks noGrp="1"/>
-          </p:cNvSpPr>
-          <p:nvPr>
-            <p:ph type="title"/>
-          </p:nvPr>
-        </p:nvSpPr>
-        <p:spPr/>
-        <p:txBody>
-          <a:bodyPr/>
-          <a:lstStyle/>
-          <a:p>
-            <a:r>
-              <a:rPr lang="en-US" dirty="0" smtClean="0"/>
-              <a:t>Potential Knobs to Turn</a:t>
-            </a:r>
-            <a:endParaRPr lang="en-US" dirty="0"/>
-          </a:p>
-        </p:txBody>
-      </p:sp>
-      <p:sp>
-        <p:nvSpPr>
-          <p:cNvPr id="3" name="Content Placeholder 2"/>
-          <p:cNvSpPr>
-            <a:spLocks noGrp="1"/>
-          </p:cNvSpPr>
-          <p:nvPr>
-            <p:ph idx="1"/>
-          </p:nvPr>
-        </p:nvSpPr>
-        <p:spPr/>
-        <p:txBody>
-          <a:bodyPr/>
-          <a:lstStyle/>
-          <a:p>
-            <a:r>
-              <a:rPr lang="en-US" dirty="0" smtClean="0"/>
-              <a:t>ALU structure</a:t>
-            </a:r>
-          </a:p>
-          <a:p>
-            <a:pPr lvl="1"/>
-            <a:r>
-              <a:rPr lang="en-US" dirty="0" smtClean="0"/>
-              <a:t>Large multiplier vs. chained small multipliers</a:t>
-            </a:r>
-          </a:p>
-          <a:p>
-            <a:pPr lvl="1"/>
-            <a:r>
-              <a:rPr lang="en-US" dirty="0" smtClean="0"/>
-              <a:t>Specific hardware units vs. general purpose</a:t>
-            </a:r>
-          </a:p>
-          <a:p>
-            <a:r>
-              <a:rPr lang="en-US" dirty="0" smtClean="0"/>
-              <a:t>Complexity of control block</a:t>
-            </a:r>
-          </a:p>
-          <a:p>
-            <a:pPr lvl="1"/>
-            <a:r>
-              <a:rPr lang="en-US" dirty="0" smtClean="0"/>
-              <a:t>Could have some state managed by Rocket</a:t>
-            </a:r>
-          </a:p>
-          <a:p>
-            <a:r>
-              <a:rPr lang="en-US" dirty="0" smtClean="0"/>
-              <a:t>Changing the algorithm </a:t>
-            </a:r>
-          </a:p>
-          <a:p>
-            <a:pPr lvl="1"/>
-            <a:r>
-              <a:rPr lang="en-US" dirty="0" smtClean="0"/>
-              <a:t>Already been done, probably just pick one</a:t>
-            </a:r>
-            <a:endParaRPr lang="en-US" dirty="0"/>
-          </a:p>
-        </p:txBody>
-      </p:sp>
-    </p:spTree>
-    <p:extLst>
-      <p:ext uri="{BB962C8B-B14F-4D97-AF65-F5344CB8AC3E}">
-        <p14:creationId xmlns:p14="http://schemas.microsoft.com/office/powerpoint/2010/main" val="1151698483"/>
-      </p:ext>
-    </p:extLst>
-  </p:cSld>
-  <p:clrMapOvr>
-    <a:masterClrMapping/>
-  </p:clrMapOvr>
-</p:sld>
-</file>
-
 <file path=ppt/slides/slide7.xml><?xml version="1.0" encoding="utf-8"?>
 <p:sld xmlns:a="http://schemas.openxmlformats.org/drawingml/2006/main" xmlns:r="http://schemas.openxmlformats.org/officeDocument/2006/relationships" xmlns:p="http://schemas.openxmlformats.org/presentationml/2006/main">
   <p:cSld>
@@ -4165,15 +4437,7 @@
             <a:pPr lvl="1"/>
             <a:r>
               <a:rPr lang="en-US" dirty="0" smtClean="0"/>
-              <a:t>Introduce </a:t>
-            </a:r>
-            <a:r>
-              <a:rPr lang="en-US" dirty="0" smtClean="0"/>
-              <a:t>more instructions with control </a:t>
-            </a:r>
-            <a:r>
-              <a:rPr lang="en-US" dirty="0" smtClean="0"/>
-              <a:t>block</a:t>
+              <a:t>Introduce more instructions with control block</a:t>
             </a:r>
           </a:p>
           <a:p>
@@ -4182,16 +4446,11 @@
               <a:rPr lang="en-US" dirty="0" smtClean="0"/>
               <a:t>Include information about key size</a:t>
             </a:r>
-            <a:endParaRPr lang="en-US" dirty="0" smtClean="0"/>
           </a:p>
           <a:p>
             <a:r>
               <a:rPr lang="en-US" dirty="0" smtClean="0"/>
-              <a:t>Memory accesses are very </a:t>
-            </a:r>
-            <a:r>
-              <a:rPr lang="en-US" dirty="0" smtClean="0"/>
-              <a:t>limited</a:t>
+              <a:t>Memory accesses are very limited</a:t>
             </a:r>
           </a:p>
           <a:p>
@@ -4205,11 +4464,21 @@
             <a:pPr lvl="1"/>
             <a:r>
               <a:rPr lang="en-US" dirty="0" smtClean="0"/>
-              <a:t>Storage vs. </a:t>
+              <a:t>Storage vs. moving data through 64-bit </a:t>
             </a:r>
             <a:r>
               <a:rPr lang="en-US" dirty="0" smtClean="0"/>
-              <a:t>moving data through 64-bit pipe</a:t>
+              <a:t>pipe</a:t>
+            </a:r>
+          </a:p>
+          <a:p>
+            <a:r>
+              <a:rPr lang="en-US" dirty="0" smtClean="0"/>
+              <a:t>Synchronous</a:t>
+            </a:r>
+            <a:r>
+              <a:rPr lang="en-US" dirty="0" smtClean="0"/>
+              <a:t> or asynchronous interface?</a:t>
             </a:r>
             <a:endParaRPr lang="en-US" dirty="0" smtClean="0"/>
           </a:p>

</xml_diff>